<commit_message>
poster tweaks (font sizes, some words)
</commit_message>
<xml_diff>
--- a/FoSSC/SCORE Poster.pptx
+++ b/FoSSC/SCORE Poster.pptx
@@ -211,7 +211,7 @@
           <a:p>
             <a:fld id="{DFDEE8B5-D014-7C4F-A3CF-CD1065611085}" type="datetimeFigureOut">
               <a:rPr lang="en-US" smtClean="0"/>
-              <a:t>4/19/24</a:t>
+              <a:t>4/20/2024</a:t>
             </a:fld>
             <a:endParaRPr lang="en-US"/>
           </a:p>
@@ -939,7 +939,7 @@
           <a:p>
             <a:fld id="{2DC29746-1088-C241-BC8C-4CC03DF23E15}" type="datetimeFigureOut">
               <a:rPr lang="en-US" smtClean="0"/>
-              <a:t>4/19/24</a:t>
+              <a:t>4/20/2024</a:t>
             </a:fld>
             <a:endParaRPr lang="en-US"/>
           </a:p>
@@ -1107,7 +1107,7 @@
           <a:p>
             <a:fld id="{2DC29746-1088-C241-BC8C-4CC03DF23E15}" type="datetimeFigureOut">
               <a:rPr lang="en-US" smtClean="0"/>
-              <a:t>4/19/24</a:t>
+              <a:t>4/20/2024</a:t>
             </a:fld>
             <a:endParaRPr lang="en-US"/>
           </a:p>
@@ -1285,7 +1285,7 @@
           <a:p>
             <a:fld id="{2DC29746-1088-C241-BC8C-4CC03DF23E15}" type="datetimeFigureOut">
               <a:rPr lang="en-US" smtClean="0"/>
-              <a:t>4/19/24</a:t>
+              <a:t>4/20/2024</a:t>
             </a:fld>
             <a:endParaRPr lang="en-US"/>
           </a:p>
@@ -1453,7 +1453,7 @@
           <a:p>
             <a:fld id="{2DC29746-1088-C241-BC8C-4CC03DF23E15}" type="datetimeFigureOut">
               <a:rPr lang="en-US" smtClean="0"/>
-              <a:t>4/19/24</a:t>
+              <a:t>4/20/2024</a:t>
             </a:fld>
             <a:endParaRPr lang="en-US"/>
           </a:p>
@@ -1696,7 +1696,7 @@
           <a:p>
             <a:fld id="{2DC29746-1088-C241-BC8C-4CC03DF23E15}" type="datetimeFigureOut">
               <a:rPr lang="en-US" smtClean="0"/>
-              <a:t>4/19/24</a:t>
+              <a:t>4/20/2024</a:t>
             </a:fld>
             <a:endParaRPr lang="en-US"/>
           </a:p>
@@ -1925,7 +1925,7 @@
           <a:p>
             <a:fld id="{2DC29746-1088-C241-BC8C-4CC03DF23E15}" type="datetimeFigureOut">
               <a:rPr lang="en-US" smtClean="0"/>
-              <a:t>4/19/24</a:t>
+              <a:t>4/20/2024</a:t>
             </a:fld>
             <a:endParaRPr lang="en-US"/>
           </a:p>
@@ -2289,7 +2289,7 @@
           <a:p>
             <a:fld id="{2DC29746-1088-C241-BC8C-4CC03DF23E15}" type="datetimeFigureOut">
               <a:rPr lang="en-US" smtClean="0"/>
-              <a:t>4/19/24</a:t>
+              <a:t>4/20/2024</a:t>
             </a:fld>
             <a:endParaRPr lang="en-US"/>
           </a:p>
@@ -2406,7 +2406,7 @@
           <a:p>
             <a:fld id="{2DC29746-1088-C241-BC8C-4CC03DF23E15}" type="datetimeFigureOut">
               <a:rPr lang="en-US" smtClean="0"/>
-              <a:t>4/19/24</a:t>
+              <a:t>4/20/2024</a:t>
             </a:fld>
             <a:endParaRPr lang="en-US"/>
           </a:p>
@@ -2501,7 +2501,7 @@
           <a:p>
             <a:fld id="{2DC29746-1088-C241-BC8C-4CC03DF23E15}" type="datetimeFigureOut">
               <a:rPr lang="en-US" smtClean="0"/>
-              <a:t>4/19/24</a:t>
+              <a:t>4/20/2024</a:t>
             </a:fld>
             <a:endParaRPr lang="en-US"/>
           </a:p>
@@ -2776,7 +2776,7 @@
           <a:p>
             <a:fld id="{2DC29746-1088-C241-BC8C-4CC03DF23E15}" type="datetimeFigureOut">
               <a:rPr lang="en-US" smtClean="0"/>
-              <a:t>4/19/24</a:t>
+              <a:t>4/20/2024</a:t>
             </a:fld>
             <a:endParaRPr lang="en-US"/>
           </a:p>
@@ -3031,7 +3031,7 @@
           <a:p>
             <a:fld id="{2DC29746-1088-C241-BC8C-4CC03DF23E15}" type="datetimeFigureOut">
               <a:rPr lang="en-US" smtClean="0"/>
-              <a:t>4/19/24</a:t>
+              <a:t>4/20/2024</a:t>
             </a:fld>
             <a:endParaRPr lang="en-US"/>
           </a:p>
@@ -3242,7 +3242,7 @@
           <a:p>
             <a:fld id="{2DC29746-1088-C241-BC8C-4CC03DF23E15}" type="datetimeFigureOut">
               <a:rPr lang="en-US" smtClean="0"/>
-              <a:t>4/19/24</a:t>
+              <a:t>4/20/2024</a:t>
             </a:fld>
             <a:endParaRPr lang="en-US"/>
           </a:p>
@@ -4436,7 +4436,7 @@
           <a:p>
             <a:pPr algn="ctr"/>
             <a:r>
-              <a:rPr lang="en-US" sz="6000" b="1">
+              <a:rPr lang="en-US" sz="5400" b="1" dirty="0">
                 <a:solidFill>
                   <a:srgbClr val="C00000"/>
                 </a:solidFill>
@@ -4447,7 +4447,7 @@
           </a:p>
           <a:p>
             <a:r>
-              <a:rPr lang="en-US" sz="4400">
+              <a:rPr lang="en-US" sz="4400" dirty="0">
                 <a:latin typeface="Garamond"/>
               </a:rPr>
               <a:t>The SCORE Network is an NSF funded organization that…</a:t>
@@ -4459,7 +4459,7 @@
               <a:buChar char="•"/>
             </a:pPr>
             <a:r>
-              <a:rPr lang="en-US" sz="4400">
+              <a:rPr lang="en-US" sz="4400" dirty="0">
                 <a:latin typeface="Garamond"/>
               </a:rPr>
               <a:t>Develops and distributes Sports Content for Outreach, Research, and Education (SCORE) </a:t>
@@ -4471,12 +4471,12 @@
               <a:buChar char="•"/>
             </a:pPr>
             <a:r>
-              <a:rPr lang="en-US" sz="4400">
+              <a:rPr lang="en-US" sz="4400" dirty="0">
                 <a:latin typeface="Garamond"/>
               </a:rPr>
               <a:t>Seeks to implement an educational framework based on real-world problems and applications </a:t>
             </a:r>
-            <a:endParaRPr lang="en-US" sz="4400">
+            <a:endParaRPr lang="en-US" sz="4400" dirty="0">
               <a:latin typeface="Garamond" panose="02020404030301010803" pitchFamily="18" charset="0"/>
             </a:endParaRPr>
           </a:p>
@@ -4486,7 +4486,7 @@
               <a:buChar char="•"/>
             </a:pPr>
             <a:r>
-              <a:rPr lang="en-US" sz="4400">
+              <a:rPr lang="en-US" sz="4400" dirty="0">
                 <a:latin typeface="Garamond"/>
               </a:rPr>
               <a:t>Increases student likelihood to be engaged in the classroom</a:t>
@@ -4494,12 +4494,12 @@
           </a:p>
           <a:p>
             <a:r>
-              <a:rPr lang="en-US" sz="4400">
+              <a:rPr lang="en-US" sz="4400" dirty="0">
                 <a:latin typeface="Garamond"/>
               </a:rPr>
               <a:t>The St. Lawrence chapter of SCORE focuses on using non-traditional sports data to develop introductory- level statistics resources for educators. </a:t>
             </a:r>
-            <a:endParaRPr lang="en-US" sz="4400">
+            <a:endParaRPr lang="en-US" sz="4400" dirty="0">
               <a:latin typeface="Garamond" panose="02020404030301010803" pitchFamily="18" charset="0"/>
             </a:endParaRPr>
           </a:p>
@@ -4535,7 +4535,7 @@
           <a:p>
             <a:pPr algn="ctr"/>
             <a:r>
-              <a:rPr lang="en-US" sz="5400" b="1">
+              <a:rPr lang="en-US" sz="5400" b="1" dirty="0">
                 <a:solidFill>
                   <a:srgbClr val="C00000"/>
                 </a:solidFill>
@@ -4544,7 +4544,7 @@
               <a:t>Nordic Ski: Randomized Block and </a:t>
             </a:r>
             <a:r>
-              <a:rPr lang="en-US" sz="5400" b="1" err="1">
+              <a:rPr lang="en-US" sz="5400" b="1" dirty="0" err="1">
                 <a:solidFill>
                   <a:srgbClr val="C00000"/>
                 </a:solidFill>
@@ -4552,7 +4552,7 @@
               </a:rPr>
               <a:t>dplyr</a:t>
             </a:r>
-            <a:endParaRPr lang="en-US" sz="5400" b="1" err="1">
+            <a:endParaRPr lang="en-US" sz="5400" b="1" dirty="0">
               <a:solidFill>
                 <a:srgbClr val="C00000"/>
               </a:solidFill>
@@ -4561,13 +4561,13 @@
           </a:p>
           <a:p>
             <a:r>
-              <a:rPr lang="en-US" sz="4400" b="1">
+              <a:rPr lang="en-US" sz="4400" b="1" dirty="0">
                 <a:latin typeface="Garamond"/>
               </a:rPr>
               <a:t>Data Info: </a:t>
             </a:r>
             <a:r>
-              <a:rPr lang="en-US" sz="4400">
+              <a:rPr lang="en-US" sz="4400" dirty="0">
                 <a:latin typeface="Garamond"/>
                 <a:ea typeface="+mn-lt"/>
                 <a:cs typeface="+mn-lt"/>
@@ -4575,13 +4575,13 @@
               <a:t>Data scraped</a:t>
             </a:r>
             <a:r>
-              <a:rPr lang="en-US" sz="4400">
+              <a:rPr lang="en-US" sz="4400" dirty="0">
                 <a:latin typeface="Garamond"/>
               </a:rPr>
               <a:t> from the FIS website </a:t>
             </a:r>
             <a:r>
-              <a:rPr lang="en-US" sz="4400">
+              <a:rPr lang="en-US" sz="4400" dirty="0">
                 <a:latin typeface="Garamond"/>
                 <a:ea typeface="+mn-lt"/>
                 <a:cs typeface="+mn-lt"/>
@@ -4589,7 +4589,7 @@
               <a:t>about a women's 10k race in Norway. </a:t>
             </a:r>
             <a:r>
-              <a:rPr lang="en-US" sz="4400">
+              <a:rPr lang="en-US" sz="4400" dirty="0">
                 <a:latin typeface="Garamond"/>
               </a:rPr>
               <a:t>The dataset has 61 skiers with 20 variables at 1.3k, 4.3k, 7.5k, and 10k intervals</a:t>
@@ -4627,7 +4627,7 @@
           <a:p>
             <a:pPr algn="ctr"/>
             <a:r>
-              <a:rPr lang="en-US" sz="6000" b="1">
+              <a:rPr lang="en-US" sz="5400" b="1" dirty="0">
                 <a:solidFill>
                   <a:srgbClr val="C00000"/>
                 </a:solidFill>
@@ -4638,7 +4638,7 @@
           </a:p>
           <a:p>
             <a:r>
-              <a:rPr lang="en-US" sz="4400">
+              <a:rPr lang="en-US" sz="4400" dirty="0">
                 <a:latin typeface="Garamond"/>
               </a:rPr>
               <a:t>Datasets in the SCORE repository come from a variety of sports, and consist of…</a:t>
@@ -4650,7 +4650,7 @@
               <a:buChar char="•"/>
             </a:pPr>
             <a:r>
-              <a:rPr lang="en-US" sz="4400">
+              <a:rPr lang="en-US" sz="4400" dirty="0">
                 <a:latin typeface="Garamond"/>
               </a:rPr>
               <a:t>The motivation behind using the data</a:t>
@@ -4662,7 +4662,7 @@
               <a:buChar char="•"/>
             </a:pPr>
             <a:r>
-              <a:rPr lang="en-US" sz="4400">
+              <a:rPr lang="en-US" sz="4400" dirty="0">
                 <a:latin typeface="Garamond"/>
               </a:rPr>
               <a:t>A description of the dataset (size and variables)</a:t>
@@ -4674,7 +4674,7 @@
               <a:buChar char="•"/>
             </a:pPr>
             <a:r>
-              <a:rPr lang="en-US" sz="4400">
+              <a:rPr lang="en-US" sz="4400" dirty="0">
                 <a:latin typeface="Garamond"/>
               </a:rPr>
               <a:t>A variety of questions that could be answered using the data</a:t>
@@ -4682,7 +4682,7 @@
           </a:p>
           <a:p>
             <a:r>
-              <a:rPr lang="en-US" sz="4400">
+              <a:rPr lang="en-US" sz="4400" dirty="0">
                 <a:latin typeface="Garamond"/>
               </a:rPr>
               <a:t>Each of the datasets highlighted in</a:t>
@@ -4690,34 +4690,34 @@
           </a:p>
           <a:p>
             <a:r>
-              <a:rPr lang="en-US" sz="4400">
+              <a:rPr lang="en-US" sz="4400" dirty="0">
                 <a:latin typeface="Garamond"/>
               </a:rPr>
               <a:t>the previous sections has been published</a:t>
             </a:r>
-            <a:endParaRPr lang="en-US" sz="7250">
+            <a:endParaRPr lang="en-US" sz="7250" dirty="0">
               <a:latin typeface="Garamond"/>
             </a:endParaRPr>
           </a:p>
           <a:p>
             <a:r>
-              <a:rPr lang="en-US" sz="4400">
-                <a:latin typeface="Garamond"/>
-              </a:rPr>
-              <a:t> in the SCORE Data Repository to be </a:t>
-            </a:r>
-            <a:endParaRPr lang="en-US" sz="7250">
-              <a:latin typeface="Garamond"/>
-            </a:endParaRPr>
-          </a:p>
-          <a:p>
-            <a:r>
-              <a:rPr lang="en-US" sz="4400">
-                <a:latin typeface="Garamond"/>
-              </a:rPr>
-              <a:t>used internationally</a:t>
-            </a:r>
-            <a:endParaRPr lang="en-US" sz="7250">
+              <a:rPr lang="en-US" sz="4400" dirty="0">
+                <a:latin typeface="Garamond"/>
+              </a:rPr>
+              <a:t>in the publicly available SCORE </a:t>
+            </a:r>
+            <a:br>
+              <a:rPr lang="en-US" sz="4400" dirty="0">
+                <a:latin typeface="Garamond"/>
+              </a:rPr>
+            </a:br>
+            <a:r>
+              <a:rPr lang="en-US" sz="4400" dirty="0">
+                <a:latin typeface="Garamond"/>
+              </a:rPr>
+              <a:t>Data Repository</a:t>
+            </a:r>
+            <a:endParaRPr lang="en-US" sz="7250" dirty="0">
               <a:latin typeface="Garamond"/>
             </a:endParaRPr>
           </a:p>
@@ -4738,7 +4738,7 @@
         <p:spPr>
           <a:xfrm>
             <a:off x="15647050" y="14537907"/>
-            <a:ext cx="12714514" cy="1015663"/>
+            <a:ext cx="12714514" cy="923330"/>
           </a:xfrm>
           <a:prstGeom prst="rect">
             <a:avLst/>
@@ -4753,7 +4753,7 @@
           <a:p>
             <a:pPr algn="ctr"/>
             <a:r>
-              <a:rPr lang="en-US" sz="6000" b="1">
+              <a:rPr lang="en-US" sz="5400" b="1" dirty="0">
                 <a:solidFill>
                   <a:srgbClr val="C00000"/>
                 </a:solidFill>
@@ -4779,7 +4779,7 @@
         <p:spPr>
           <a:xfrm>
             <a:off x="15647050" y="5606360"/>
-            <a:ext cx="12714514" cy="1938992"/>
+            <a:ext cx="12714514" cy="1754326"/>
           </a:xfrm>
           <a:prstGeom prst="rect">
             <a:avLst/>
@@ -4794,7 +4794,7 @@
           <a:p>
             <a:pPr algn="ctr"/>
             <a:r>
-              <a:rPr lang="en-US" sz="6000" b="1">
+              <a:rPr lang="en-US" sz="5400" b="1" dirty="0">
                 <a:solidFill>
                   <a:srgbClr val="C00000"/>
                 </a:solidFill>
@@ -4802,7 +4802,7 @@
               </a:rPr>
               <a:t>Olympic Medals: Data Cleaning and Summarization</a:t>
             </a:r>
-            <a:endParaRPr lang="en-US" sz="6000" b="1">
+            <a:endParaRPr lang="en-US" sz="5400" b="1" dirty="0">
               <a:solidFill>
                 <a:srgbClr val="C00000"/>
               </a:solidFill>
@@ -4841,15 +4841,32 @@
           <a:p>
             <a:pPr algn="ctr"/>
             <a:r>
-              <a:rPr lang="en-US" sz="6000" b="1">
+              <a:rPr lang="en-US" sz="5400" b="1" dirty="0">
                 <a:solidFill>
                   <a:srgbClr val="C00000"/>
                 </a:solidFill>
                 <a:latin typeface="Garamond"/>
               </a:rPr>
-              <a:t>Giant Slalom: Paired Data and Data Tidying</a:t>
-            </a:r>
-            <a:endParaRPr lang="en-US" sz="6000" b="1">
+              <a:t>Giant Slalom: Paired Data and </a:t>
+            </a:r>
+            <a:br>
+              <a:rPr lang="en-US" sz="5400" b="1" dirty="0">
+                <a:solidFill>
+                  <a:srgbClr val="C00000"/>
+                </a:solidFill>
+                <a:latin typeface="Garamond"/>
+              </a:rPr>
+            </a:br>
+            <a:r>
+              <a:rPr lang="en-US" sz="5400" b="1" dirty="0">
+                <a:solidFill>
+                  <a:srgbClr val="C00000"/>
+                </a:solidFill>
+                <a:latin typeface="Garamond"/>
+              </a:rPr>
+              <a:t>Data Tidying</a:t>
+            </a:r>
+            <a:endParaRPr lang="en-US" sz="5400" b="1" dirty="0">
               <a:solidFill>
                 <a:srgbClr val="C00000"/>
               </a:solidFill>
@@ -4858,24 +4875,24 @@
           </a:p>
           <a:p>
             <a:r>
-              <a:rPr lang="en-US" sz="4400" b="1">
+              <a:rPr lang="en-US" sz="4400" b="1" dirty="0">
                 <a:latin typeface="Garamond"/>
               </a:rPr>
               <a:t>Data Info: </a:t>
             </a:r>
             <a:r>
-              <a:rPr lang="en-US" sz="4400">
+              <a:rPr lang="en-US" sz="4400" dirty="0">
                 <a:latin typeface="Garamond"/>
               </a:rPr>
               <a:t>Alpine ski data scraped from FIS website containing information on two runs of women's GS at Mont Tremblant</a:t>
             </a:r>
-            <a:endParaRPr lang="en-US" sz="4400">
+            <a:endParaRPr lang="en-US" sz="4400" dirty="0">
               <a:latin typeface="Garamond" panose="02020404030301010803" pitchFamily="18" charset="0"/>
             </a:endParaRPr>
           </a:p>
           <a:p>
             <a:r>
-              <a:rPr lang="en-US" sz="4400" b="1">
+              <a:rPr lang="en-US" sz="4400" b="1" dirty="0">
                 <a:latin typeface="Garamond"/>
               </a:rPr>
               <a:t>Module Goals:</a:t>
@@ -4887,18 +4904,18 @@
               <a:buChar char="•"/>
             </a:pPr>
             <a:r>
-              <a:rPr lang="en-US" sz="4400">
+              <a:rPr lang="en-US" sz="4400" dirty="0">
                 <a:latin typeface="Garamond"/>
               </a:rPr>
               <a:t>Use paired data to perform a test for </a:t>
             </a:r>
             <a:br>
-              <a:rPr lang="en-US" sz="4400">
+              <a:rPr lang="en-US" sz="4400" dirty="0">
                 <a:latin typeface="Garamond"/>
               </a:rPr>
             </a:br>
             <a:r>
-              <a:rPr lang="en-US" sz="4400">
+              <a:rPr lang="en-US" sz="4400" dirty="0">
                 <a:latin typeface="Garamond"/>
               </a:rPr>
               <a:t>difference in means, find a confidence interval, obtain summary statistics, and interpret findings</a:t>
@@ -4910,31 +4927,34 @@
               <a:buChar char="•"/>
             </a:pPr>
             <a:r>
-              <a:rPr lang="en-US" sz="4400">
+              <a:rPr lang="en-US" sz="4400" dirty="0">
                 <a:latin typeface="Garamond"/>
               </a:rPr>
               <a:t>Clean an untidy data set using </a:t>
             </a:r>
             <a:r>
-              <a:rPr lang="en-US" sz="4400" err="1">
-                <a:latin typeface="Garamond"/>
+              <a:rPr lang="en-US" sz="4400" dirty="0" err="1">
+                <a:latin typeface="Garamond" panose="02020404030301010803" pitchFamily="18" charset="0"/>
+                <a:cs typeface="Courier New" panose="02070309020205020404" pitchFamily="49" charset="0"/>
               </a:rPr>
               <a:t>tidyr</a:t>
             </a:r>
             <a:r>
-              <a:rPr lang="en-US" sz="4400">
+              <a:rPr lang="en-US" sz="4400" dirty="0">
                 <a:latin typeface="Garamond"/>
               </a:rPr>
               <a:t> and </a:t>
             </a:r>
             <a:r>
-              <a:rPr lang="en-US" sz="4400" err="1">
-                <a:latin typeface="Garamond"/>
+              <a:rPr lang="en-US" sz="4400" dirty="0" err="1">
+                <a:latin typeface="Garamond" panose="02020404030301010803" pitchFamily="18" charset="0"/>
+                <a:cs typeface="Courier New" panose="02070309020205020404" pitchFamily="49" charset="0"/>
               </a:rPr>
               <a:t>dplyr</a:t>
             </a:r>
-            <a:endParaRPr lang="en-US" sz="4400">
-              <a:latin typeface="Garamond"/>
+            <a:endParaRPr lang="en-US" sz="4400" dirty="0">
+              <a:latin typeface="Garamond" panose="02020404030301010803" pitchFamily="18" charset="0"/>
+              <a:cs typeface="Courier New" panose="02070309020205020404" pitchFamily="49" charset="0"/>
             </a:endParaRPr>
           </a:p>
         </p:txBody>
@@ -4969,24 +4989,41 @@
           <a:p>
             <a:pPr algn="ctr"/>
             <a:r>
-              <a:rPr lang="en-US" sz="6000" b="1">
+              <a:rPr lang="en-US" sz="5400" b="1" dirty="0">
                 <a:solidFill>
                   <a:srgbClr val="C00000"/>
                 </a:solidFill>
                 <a:latin typeface="Garamond"/>
               </a:rPr>
-              <a:t>Diving: Difference in Means Hypothesis Tests</a:t>
-            </a:r>
-          </a:p>
-          <a:p>
-            <a:r>
-              <a:rPr lang="en-US" sz="4400" b="1">
+              <a:t>Diving: Difference in Means </a:t>
+            </a:r>
+            <a:br>
+              <a:rPr lang="en-US" sz="5400" b="1" dirty="0">
+                <a:solidFill>
+                  <a:srgbClr val="C00000"/>
+                </a:solidFill>
+                <a:latin typeface="Garamond"/>
+              </a:rPr>
+            </a:br>
+            <a:r>
+              <a:rPr lang="en-US" sz="5400" b="1" dirty="0">
+                <a:solidFill>
+                  <a:srgbClr val="C00000"/>
+                </a:solidFill>
+                <a:latin typeface="Garamond"/>
+              </a:rPr>
+              <a:t>Hypothesis Tests</a:t>
+            </a:r>
+          </a:p>
+          <a:p>
+            <a:r>
+              <a:rPr lang="en-US" sz="4400" b="1" dirty="0">
                 <a:latin typeface="Garamond"/>
               </a:rPr>
               <a:t>Data Info:</a:t>
             </a:r>
             <a:r>
-              <a:rPr lang="en-US" sz="4400">
+              <a:rPr lang="en-US" sz="4400" dirty="0">
                 <a:latin typeface="Garamond"/>
               </a:rPr>
               <a:t> Diving results from the 2022 FINA Junior World Championships from women divers aged 16 – 18.</a:t>
@@ -4994,24 +5031,24 @@
           </a:p>
           <a:p>
             <a:r>
-              <a:rPr lang="en-US" sz="1050">
+              <a:rPr lang="en-US" sz="1050" dirty="0">
                 <a:ea typeface="Calibri"/>
                 <a:cs typeface="Calibri"/>
               </a:rPr>
               <a:t>--</a:t>
             </a:r>
-            <a:endParaRPr lang="en-US" sz="7250">
+            <a:endParaRPr lang="en-US" sz="7250" dirty="0">
               <a:cs typeface="Calibri"/>
             </a:endParaRPr>
           </a:p>
           <a:p>
             <a:r>
-              <a:rPr lang="en-US" sz="4400" b="1">
+              <a:rPr lang="en-US" sz="4400" b="1" dirty="0">
                 <a:latin typeface="Garamond"/>
               </a:rPr>
               <a:t>Module Goals:</a:t>
             </a:r>
-            <a:endParaRPr lang="en-US" sz="4400">
+            <a:endParaRPr lang="en-US" sz="4400" dirty="0">
               <a:latin typeface="Garamond" panose="02020404030301010803" pitchFamily="18" charset="0"/>
             </a:endParaRPr>
           </a:p>
@@ -5021,45 +5058,45 @@
               <a:buChar char="•"/>
             </a:pPr>
             <a:r>
-              <a:rPr lang="en-US" sz="4400">
+              <a:rPr lang="en-US" sz="4400" dirty="0">
                 <a:latin typeface="Garamond"/>
               </a:rPr>
               <a:t>Conduct difference in means </a:t>
             </a:r>
             <a:br>
-              <a:rPr lang="en-US" sz="4400">
+              <a:rPr lang="en-US" sz="4400" dirty="0">
                 <a:latin typeface="Garamond"/>
               </a:rPr>
             </a:br>
             <a:r>
-              <a:rPr lang="en-US" sz="4400">
+              <a:rPr lang="en-US" sz="4400" dirty="0">
                 <a:latin typeface="Garamond"/>
               </a:rPr>
               <a:t>hypothesis tests to test if there </a:t>
             </a:r>
             <a:br>
-              <a:rPr lang="en-US" sz="4400">
+              <a:rPr lang="en-US" sz="4400" dirty="0">
                 <a:latin typeface="Garamond"/>
               </a:rPr>
             </a:br>
             <a:r>
-              <a:rPr lang="en-US" sz="4400">
+              <a:rPr lang="en-US" sz="4400" dirty="0">
                 <a:latin typeface="Garamond"/>
               </a:rPr>
               <a:t>is a significant difference in mean </a:t>
             </a:r>
             <a:br>
-              <a:rPr lang="en-US" sz="4400">
+              <a:rPr lang="en-US" sz="4400" dirty="0">
                 <a:latin typeface="Garamond"/>
               </a:rPr>
             </a:br>
             <a:r>
-              <a:rPr lang="en-US" sz="4400">
+              <a:rPr lang="en-US" sz="4400" dirty="0">
                 <a:latin typeface="Garamond"/>
               </a:rPr>
               <a:t>points scored between divers of  different ages</a:t>
             </a:r>
-            <a:endParaRPr lang="en-US" sz="4400">
+            <a:endParaRPr lang="en-US" sz="4400" dirty="0">
               <a:latin typeface="Garamond" panose="02020404030301010803" pitchFamily="18" charset="0"/>
             </a:endParaRPr>
           </a:p>
@@ -5069,12 +5106,12 @@
               <a:buChar char="•"/>
             </a:pPr>
             <a:r>
-              <a:rPr lang="en-US" sz="4400">
+              <a:rPr lang="en-US" sz="4400" dirty="0">
                 <a:latin typeface="Garamond"/>
               </a:rPr>
               <a:t>Practice conducting hypothesis tests in R or by hand.</a:t>
             </a:r>
-            <a:endParaRPr lang="en-US" sz="4400">
+            <a:endParaRPr lang="en-US" sz="4400" dirty="0">
               <a:latin typeface="Garamond" panose="02020404030301010803" pitchFamily="18" charset="0"/>
             </a:endParaRPr>
           </a:p>
@@ -5083,7 +5120,7 @@
               <a:buFont typeface="Arial"/>
               <a:buChar char="•"/>
             </a:pPr>
-            <a:endParaRPr lang="en-US" sz="4400">
+            <a:endParaRPr lang="en-US" sz="4400" dirty="0">
               <a:solidFill>
                 <a:srgbClr val="C00000"/>
               </a:solidFill>
@@ -5095,7 +5132,7 @@
               <a:buFont typeface="Arial"/>
               <a:buChar char="•"/>
             </a:pPr>
-            <a:endParaRPr lang="en-US" sz="4400">
+            <a:endParaRPr lang="en-US" sz="4400" dirty="0">
               <a:solidFill>
                 <a:srgbClr val="C00000"/>
               </a:solidFill>
@@ -5118,7 +5155,7 @@
         </p:nvSpPr>
         <p:spPr>
           <a:xfrm>
-            <a:off x="15624883" y="23616232"/>
+            <a:off x="15624187" y="23663367"/>
             <a:ext cx="12714514" cy="1754326"/>
           </a:xfrm>
           <a:prstGeom prst="rect">
@@ -5134,13 +5171,13 @@
           <a:p>
             <a:pPr algn="ctr"/>
             <a:r>
-              <a:rPr lang="en-US" sz="5400" b="1">
+              <a:rPr lang="en-US" sz="5400" b="1" dirty="0">
                 <a:solidFill>
                   <a:srgbClr val="C00000"/>
                 </a:solidFill>
                 <a:latin typeface="Garamond" panose="02020404030301010803" pitchFamily="18" charset="0"/>
               </a:rPr>
-              <a:t>League of Legends: Chi-squared Distribution </a:t>
+              <a:t>League of Legends: Chi-Squared Distribution </a:t>
             </a:r>
           </a:p>
         </p:txBody>
@@ -5175,7 +5212,7 @@
           <a:p>
             <a:pPr algn="r"/>
             <a:r>
-              <a:rPr lang="en-US" sz="4400">
+              <a:rPr lang="en-US" sz="4400" dirty="0">
                 <a:solidFill>
                   <a:srgbClr val="C00000"/>
                 </a:solidFill>
@@ -5185,7 +5222,7 @@
               </a:rPr>
               <a:t>Eric Seltzer (Data Science and Finance)</a:t>
             </a:r>
-            <a:endParaRPr lang="en-US" sz="4400">
+            <a:endParaRPr lang="en-US" sz="4400" dirty="0">
               <a:latin typeface="Garamond"/>
               <a:cs typeface="Calibri" panose="020F0502020204030204"/>
             </a:endParaRPr>
@@ -5222,7 +5259,7 @@
           <a:p>
             <a:pPr algn="r"/>
             <a:r>
-              <a:rPr lang="en-US" sz="4400">
+              <a:rPr lang="en-US" sz="4400" dirty="0">
                 <a:solidFill>
                   <a:srgbClr val="C00000"/>
                 </a:solidFill>
@@ -5230,7 +5267,7 @@
               </a:rPr>
               <a:t>Emma Deering (Data Science and Geology)</a:t>
             </a:r>
-            <a:endParaRPr lang="en-US" sz="4400">
+            <a:endParaRPr lang="en-US" sz="4400" dirty="0">
               <a:latin typeface="Garamond"/>
             </a:endParaRPr>
           </a:p>
@@ -5266,7 +5303,7 @@
           <a:p>
             <a:pPr algn="r"/>
             <a:r>
-              <a:rPr lang="en-US" sz="4400">
+              <a:rPr lang="en-US" sz="4400" dirty="0">
                 <a:solidFill>
                   <a:srgbClr val="C00000"/>
                 </a:solidFill>
@@ -5274,7 +5311,7 @@
               </a:rPr>
               <a:t>Norah Kuduk (Computer Science and Statistics)</a:t>
             </a:r>
-            <a:endParaRPr lang="en-US" sz="4400"/>
+            <a:endParaRPr lang="en-US" sz="4400" dirty="0"/>
           </a:p>
         </p:txBody>
       </p:sp>
@@ -5308,7 +5345,7 @@
           <a:p>
             <a:pPr algn="r"/>
             <a:r>
-              <a:rPr lang="en-US" sz="4400">
+              <a:rPr lang="en-US" sz="4400" dirty="0">
                 <a:solidFill>
                   <a:srgbClr val="C00000"/>
                 </a:solidFill>
@@ -5316,7 +5353,7 @@
               </a:rPr>
               <a:t>George Charalambous (Data Science) </a:t>
             </a:r>
-            <a:endParaRPr lang="en-US" sz="4400"/>
+            <a:endParaRPr lang="en-US" sz="4400" dirty="0"/>
           </a:p>
         </p:txBody>
       </p:sp>
@@ -5350,7 +5387,7 @@
           <a:p>
             <a:pPr algn="r"/>
             <a:r>
-              <a:rPr lang="en-US" sz="4400">
+              <a:rPr lang="en-US" sz="4400" dirty="0">
                 <a:solidFill>
                   <a:srgbClr val="C00000"/>
                 </a:solidFill>
@@ -5358,7 +5395,7 @@
               </a:rPr>
               <a:t>Abigail Winston Smith (Data Science and History)</a:t>
             </a:r>
-            <a:endParaRPr lang="en-US" sz="4400">
+            <a:endParaRPr lang="en-US" sz="4400" dirty="0">
               <a:latin typeface="Garamond"/>
             </a:endParaRPr>
           </a:p>
@@ -5605,7 +5642,7 @@
           <a:lstStyle/>
           <a:p>
             <a:r>
-              <a:rPr lang="en-US" sz="4400" b="1">
+              <a:rPr lang="en-US" sz="4400" b="1" dirty="0">
                 <a:latin typeface="Garamond"/>
               </a:rPr>
               <a:t>Module Goals:</a:t>
@@ -5617,7 +5654,7 @@
               <a:buChar char="•"/>
             </a:pPr>
             <a:r>
-              <a:rPr lang="en-US" sz="4400">
+              <a:rPr lang="en-US" sz="4400" dirty="0">
                 <a:latin typeface="Garamond"/>
               </a:rPr>
               <a:t>Understand histograms and outliers and their relevance in statistical analysis.</a:t>
@@ -5629,7 +5666,7 @@
               <a:buChar char="•"/>
             </a:pPr>
             <a:r>
-              <a:rPr lang="en-US" sz="4400">
+              <a:rPr lang="en-US" sz="4400" dirty="0">
                 <a:latin typeface="Garamond"/>
               </a:rPr>
               <a:t>Highlight use of summary statistics in outlier detection</a:t>
@@ -5666,13 +5703,13 @@
           <a:lstStyle/>
           <a:p>
             <a:r>
-              <a:rPr lang="en-US" sz="4400" b="1">
+              <a:rPr lang="en-US" sz="4400" b="1" dirty="0">
                 <a:latin typeface="Garamond"/>
               </a:rPr>
               <a:t>Data Info: </a:t>
             </a:r>
             <a:r>
-              <a:rPr lang="en-US" sz="4400">
+              <a:rPr lang="en-US" sz="4400" dirty="0">
                 <a:latin typeface="Garamond"/>
               </a:rPr>
               <a:t>Lap times for each driver (and constructor) that participated in the 2023 F1 Miami Grand Prix</a:t>
@@ -5798,7 +5835,7 @@
         <p:spPr>
           <a:xfrm>
             <a:off x="15602716" y="26520890"/>
-            <a:ext cx="7991051" cy="5509200"/>
+            <a:ext cx="7991051" cy="4832092"/>
           </a:xfrm>
           <a:prstGeom prst="rect">
             <a:avLst/>
@@ -5812,7 +5849,7 @@
           <a:lstStyle/>
           <a:p>
             <a:r>
-              <a:rPr lang="en-US" sz="4400" b="1">
+              <a:rPr lang="en-US" sz="4400" b="1" dirty="0">
                 <a:latin typeface="Garamond"/>
               </a:rPr>
               <a:t>Module Goals:</a:t>
@@ -5824,10 +5861,10 @@
               <a:buChar char="•"/>
             </a:pPr>
             <a:r>
-              <a:rPr lang="en-US" sz="4400">
-                <a:latin typeface="Garamond"/>
-              </a:rPr>
-              <a:t>Utilize Chi-Squared analysis to explore significant relationships between top and bottom five most popular champions</a:t>
+              <a:rPr lang="en-US" sz="4400" dirty="0">
+                <a:latin typeface="Garamond"/>
+              </a:rPr>
+              <a:t>Utilize Chi-Squared analysis to explore relationships between popular champions</a:t>
             </a:r>
           </a:p>
           <a:p>
@@ -5836,14 +5873,14 @@
               <a:buChar char="•"/>
             </a:pPr>
             <a:r>
-              <a:rPr lang="en-US" sz="4400">
+              <a:rPr lang="en-US" sz="4400" dirty="0">
                 <a:latin typeface="Garamond"/>
               </a:rPr>
               <a:t>Understand use of Chi-Squared to identify statistical significance</a:t>
             </a:r>
           </a:p>
           <a:p>
-            <a:endParaRPr lang="en-US" sz="4400">
+            <a:endParaRPr lang="en-US" sz="4400" dirty="0">
               <a:latin typeface="Garamond" panose="02020404030301010803" pitchFamily="18" charset="0"/>
             </a:endParaRPr>
           </a:p>
@@ -5908,7 +5945,7 @@
           <a:lstStyle/>
           <a:p>
             <a:r>
-              <a:rPr lang="en-US" sz="4400" b="1">
+              <a:rPr lang="en-US" sz="4400" b="1" dirty="0">
                 <a:latin typeface="Garamond"/>
               </a:rPr>
               <a:t>Module Goals:</a:t>
@@ -5920,7 +5957,7 @@
               <a:buChar char="•"/>
             </a:pPr>
             <a:r>
-              <a:rPr lang="en-US" sz="4400">
+              <a:rPr lang="en-US" sz="4400" dirty="0">
                 <a:latin typeface="Garamond"/>
               </a:rPr>
               <a:t>Use randomized block design to assess difference in mean speed based on skier and distance interval </a:t>
@@ -5932,19 +5969,19 @@
               <a:buChar char="•"/>
             </a:pPr>
             <a:r>
-              <a:rPr lang="en-US" sz="4400">
+              <a:rPr lang="en-US" sz="4400" dirty="0">
                 <a:latin typeface="Garamond"/>
               </a:rPr>
               <a:t>Use </a:t>
             </a:r>
             <a:r>
-              <a:rPr lang="en-US" sz="4400" err="1">
-                <a:latin typeface="Garamond"/>
+              <a:rPr lang="en-US" sz="4400" dirty="0" err="1">
+                <a:latin typeface="Garamond" panose="02020404030301010803" pitchFamily="18" charset="0"/>
               </a:rPr>
               <a:t>dplyr</a:t>
             </a:r>
             <a:r>
-              <a:rPr lang="en-US" sz="4400">
+              <a:rPr lang="en-US" sz="4400" dirty="0">
                 <a:latin typeface="Garamond"/>
               </a:rPr>
               <a:t> to calculate the speed of each skier at each distance </a:t>
@@ -5967,7 +6004,7 @@
         <p:spPr>
           <a:xfrm>
             <a:off x="1286268" y="14464112"/>
-            <a:ext cx="12714514" cy="8463855"/>
+            <a:ext cx="12714514" cy="8679299"/>
           </a:xfrm>
           <a:prstGeom prst="rect">
             <a:avLst/>
@@ -5982,7 +6019,7 @@
           <a:p>
             <a:pPr algn="ctr"/>
             <a:r>
-              <a:rPr lang="en-US" sz="6000" b="1">
+              <a:rPr lang="en-US" sz="5400" b="1" dirty="0">
                 <a:solidFill>
                   <a:srgbClr val="C00000"/>
                 </a:solidFill>
@@ -5993,14 +6030,19 @@
             </a:r>
           </a:p>
           <a:p>
-            <a:r>
-              <a:rPr lang="en-US" sz="4400" b="1">
+            <a:endParaRPr lang="en-US" sz="1400" b="1" dirty="0">
+              <a:latin typeface="Garamond"/>
+            </a:endParaRPr>
+          </a:p>
+          <a:p>
+            <a:r>
+              <a:rPr lang="en-US" sz="4400" b="1" dirty="0">
                 <a:latin typeface="Garamond"/>
               </a:rPr>
               <a:t>Data Info:</a:t>
             </a:r>
             <a:r>
-              <a:rPr lang="en-US" sz="4400">
+              <a:rPr lang="en-US" sz="4400" dirty="0">
                 <a:latin typeface="Garamond"/>
               </a:rPr>
               <a:t> Defense and striking statistics for each fighter that competed in the UFC from 1993 to 2021.</a:t>
@@ -6008,7 +6050,7 @@
           </a:p>
           <a:p>
             <a:r>
-              <a:rPr lang="en-US" sz="4400" b="1">
+              <a:rPr lang="en-US" sz="4400" b="1" dirty="0">
                 <a:latin typeface="Garamond"/>
               </a:rPr>
               <a:t>Module Goals:</a:t>
@@ -6020,18 +6062,18 @@
               <a:buChar char="•"/>
             </a:pPr>
             <a:r>
-              <a:rPr lang="en-US" sz="4400">
+              <a:rPr lang="en-US" sz="4400" dirty="0">
                 <a:latin typeface="Garamond"/>
               </a:rPr>
               <a:t>Using the Normal distribution </a:t>
             </a:r>
             <a:br>
-              <a:rPr lang="en-US" sz="4400">
+              <a:rPr lang="en-US" sz="4400" dirty="0">
                 <a:latin typeface="Garamond"/>
               </a:rPr>
             </a:br>
             <a:r>
-              <a:rPr lang="en-US" sz="4400">
+              <a:rPr lang="en-US" sz="4400" dirty="0">
                 <a:latin typeface="Garamond"/>
               </a:rPr>
               <a:t>in a real-world application </a:t>
@@ -6043,18 +6085,18 @@
               <a:buChar char="•"/>
             </a:pPr>
             <a:r>
-              <a:rPr lang="en-US" sz="4400">
+              <a:rPr lang="en-US" sz="4400" dirty="0">
                 <a:latin typeface="Garamond"/>
               </a:rPr>
               <a:t>Identifying proportions, quartiles</a:t>
             </a:r>
             <a:br>
-              <a:rPr lang="en-US" sz="4400">
+              <a:rPr lang="en-US" sz="4400" dirty="0">
                 <a:latin typeface="Garamond"/>
               </a:rPr>
             </a:br>
             <a:r>
-              <a:rPr lang="en-US" sz="4400">
+              <a:rPr lang="en-US" sz="4400" dirty="0">
                 <a:latin typeface="Garamond"/>
               </a:rPr>
               <a:t>and ranges</a:t>
@@ -6066,30 +6108,30 @@
               <a:buChar char="•"/>
             </a:pPr>
             <a:r>
-              <a:rPr lang="en-US" sz="4400">
+              <a:rPr lang="en-US" sz="4400" dirty="0">
                 <a:latin typeface="Garamond"/>
               </a:rPr>
               <a:t>Using </a:t>
             </a:r>
             <a:r>
-              <a:rPr lang="en-US" sz="4400" err="1">
+              <a:rPr lang="en-US" sz="4400" dirty="0" err="1">
                 <a:latin typeface="Garamond"/>
               </a:rPr>
               <a:t>StatKey</a:t>
             </a:r>
             <a:r>
-              <a:rPr lang="en-US" sz="4400">
+              <a:rPr lang="en-US" sz="4400" dirty="0">
                 <a:latin typeface="Garamond"/>
               </a:rPr>
               <a:t> given a mean and </a:t>
             </a:r>
             <a:br>
-              <a:rPr lang="en-US" sz="4400">
+              <a:rPr lang="en-US" sz="4400" dirty="0">
                 <a:latin typeface="Garamond"/>
               </a:rPr>
             </a:br>
             <a:r>
-              <a:rPr lang="en-US" sz="4400">
+              <a:rPr lang="en-US" sz="4400" dirty="0">
                 <a:latin typeface="Garamond"/>
               </a:rPr>
               <a:t>standard deviation</a:t>
@@ -6097,7 +6139,7 @@
           </a:p>
           <a:p>
             <a:r>
-              <a:rPr lang="en-US" sz="4400">
+              <a:rPr lang="en-US" sz="4400" dirty="0">
                 <a:solidFill>
                   <a:srgbClr val="C00000"/>
                 </a:solidFill>
@@ -6111,7 +6153,7 @@
               <a:buFont typeface="Arial"/>
               <a:buChar char="•"/>
             </a:pPr>
-            <a:endParaRPr lang="en-US" sz="4400">
+            <a:endParaRPr lang="en-US" sz="4400" dirty="0">
               <a:solidFill>
                 <a:srgbClr val="C00000"/>
               </a:solidFill>
@@ -6150,33 +6192,15 @@
           <a:p>
             <a:pPr algn="r"/>
             <a:r>
-              <a:rPr lang="en-US" sz="4400">
+              <a:rPr lang="en-US" sz="4400" dirty="0">
                 <a:solidFill>
                   <a:srgbClr val="C00000"/>
                 </a:solidFill>
                 <a:latin typeface="Garamond"/>
               </a:rPr>
-              <a:t>Brendan </a:t>
-            </a:r>
-            <a:r>
-              <a:rPr lang="en-US" sz="4400" err="1">
-                <a:solidFill>
-                  <a:srgbClr val="C00000"/>
-                </a:solidFill>
-                <a:latin typeface="Garamond"/>
-              </a:rPr>
-              <a:t>Karadenes</a:t>
-            </a:r>
-            <a:r>
-              <a:rPr lang="en-US" sz="4400">
-                <a:solidFill>
-                  <a:srgbClr val="C00000"/>
-                </a:solidFill>
-                <a:latin typeface="Garamond"/>
-              </a:rPr>
-              <a:t> (Data Science)</a:t>
-            </a:r>
-            <a:endParaRPr lang="en-US" sz="4400">
+              <a:t>Brendan Karadenes (Data Science)</a:t>
+            </a:r>
+            <a:endParaRPr lang="en-US" sz="4400" dirty="0">
               <a:latin typeface="Garamond"/>
             </a:endParaRPr>
           </a:p>
@@ -6320,13 +6344,13 @@
           <a:lstStyle/>
           <a:p>
             <a:r>
-              <a:rPr lang="en-US" sz="4400" b="1">
+              <a:rPr lang="en-US" sz="4400" b="1" dirty="0">
                 <a:latin typeface="Garamond"/>
               </a:rPr>
               <a:t>Data Info: </a:t>
             </a:r>
             <a:r>
-              <a:rPr lang="en-US" sz="4400">
+              <a:rPr lang="en-US" sz="4400" dirty="0">
                 <a:latin typeface="Garamond"/>
               </a:rPr>
               <a:t>Olympics info about both medals and athletes</a:t>

</xml_diff>